<commit_message>
Thêm chức năng show pass
</commit_message>
<xml_diff>
--- a/KTGK_63133615/KTGK_63133615.pptx
+++ b/KTGK_63133615/KTGK_63133615.pptx
@@ -105,6 +105,11 @@
       </a:defRPr>
     </a:lvl9pPr>
   </p:defaultTextStyle>
+  <p:extLst>
+    <p:ext uri="{EFAFB233-063F-42B5-8137-9DF3F51BA10A}">
+      <p15:sldGuideLst xmlns:p15="http://schemas.microsoft.com/office/powerpoint/2012/main"/>
+    </p:ext>
+  </p:extLst>
 </p:presentation>
 </file>
 
@@ -3567,6 +3572,170 @@
           <a:chExt cx="0" cy="0"/>
         </a:xfrm>
       </p:grpSpPr>
+      <p:pic>
+        <p:nvPicPr>
+          <p:cNvPr id="3" name="Picture 2">
+            <a:extLst>
+              <a:ext uri="{FF2B5EF4-FFF2-40B4-BE49-F238E27FC236}">
+                <a16:creationId xmlns:a16="http://schemas.microsoft.com/office/drawing/2014/main" id="{01ECDBDB-8773-587B-FD16-5BB45459ADA3}"/>
+              </a:ext>
+            </a:extLst>
+          </p:cNvPr>
+          <p:cNvPicPr>
+            <a:picLocks noChangeAspect="1"/>
+          </p:cNvPicPr>
+          <p:nvPr/>
+        </p:nvPicPr>
+        <p:blipFill>
+          <a:blip r:embed="rId2"/>
+          <a:stretch>
+            <a:fillRect/>
+          </a:stretch>
+        </p:blipFill>
+        <p:spPr>
+          <a:xfrm>
+            <a:off x="505335" y="1128391"/>
+            <a:ext cx="6335009" cy="4601217"/>
+          </a:xfrm>
+          <a:prstGeom prst="rect">
+            <a:avLst/>
+          </a:prstGeom>
+        </p:spPr>
+      </p:pic>
+      <p:sp>
+        <p:nvSpPr>
+          <p:cNvPr id="4" name="TextBox 3">
+            <a:extLst>
+              <a:ext uri="{FF2B5EF4-FFF2-40B4-BE49-F238E27FC236}">
+                <a16:creationId xmlns:a16="http://schemas.microsoft.com/office/drawing/2014/main" id="{752403B0-6FAB-D244-5348-F034813B8FB3}"/>
+              </a:ext>
+            </a:extLst>
+          </p:cNvPr>
+          <p:cNvSpPr txBox="1"/>
+          <p:nvPr/>
+        </p:nvSpPr>
+        <p:spPr>
+          <a:xfrm>
+            <a:off x="7699248" y="1033272"/>
+            <a:ext cx="3803904" cy="3970318"/>
+          </a:xfrm>
+          <a:prstGeom prst="rect">
+            <a:avLst/>
+          </a:prstGeom>
+          <a:noFill/>
+        </p:spPr>
+        <p:txBody>
+          <a:bodyPr wrap="square" rtlCol="0">
+            <a:spAutoFit/>
+          </a:bodyPr>
+          <a:lstStyle/>
+          <a:p>
+            <a:pPr marL="457200" indent="-457200">
+              <a:buFont typeface="Arial" panose="020B0604020202020204" pitchFamily="34" charset="0"/>
+              <a:buChar char="•"/>
+            </a:pPr>
+            <a:r>
+              <a:rPr lang="en-US" sz="2800" b="1">
+                <a:solidFill>
+                  <a:schemeClr val="bg1"/>
+                </a:solidFill>
+              </a:rPr>
+              <a:t>Giao diện của cửa sổ đăng nhập và có vị trí nằm giữa màn hình FullHD</a:t>
+            </a:r>
+          </a:p>
+          <a:p>
+            <a:pPr marL="457200" indent="-457200">
+              <a:buFont typeface="Arial" panose="020B0604020202020204" pitchFamily="34" charset="0"/>
+              <a:buChar char="•"/>
+            </a:pPr>
+            <a:r>
+              <a:rPr lang="en-US" sz="2800" b="1">
+                <a:solidFill>
+                  <a:schemeClr val="bg1"/>
+                </a:solidFill>
+              </a:rPr>
+              <a:t>Các cài là this.setLocation(x,y)</a:t>
+            </a:r>
+          </a:p>
+          <a:p>
+            <a:pPr marL="457200" indent="-457200">
+              <a:buFont typeface="Arial" panose="020B0604020202020204" pitchFamily="34" charset="0"/>
+              <a:buChar char="•"/>
+            </a:pPr>
+            <a:r>
+              <a:rPr lang="en-US" sz="2800" b="1">
+                <a:solidFill>
+                  <a:schemeClr val="bg1"/>
+                </a:solidFill>
+              </a:rPr>
+              <a:t>Trong đó x,y được tính từ công thức sau</a:t>
+            </a:r>
+            <a:endParaRPr lang="vi-VN" sz="2800" b="1">
+              <a:solidFill>
+                <a:schemeClr val="bg1"/>
+              </a:solidFill>
+            </a:endParaRPr>
+          </a:p>
+        </p:txBody>
+      </p:sp>
+      <p:sp>
+        <p:nvSpPr>
+          <p:cNvPr id="6" name="TextBox 5">
+            <a:extLst>
+              <a:ext uri="{FF2B5EF4-FFF2-40B4-BE49-F238E27FC236}">
+                <a16:creationId xmlns:a16="http://schemas.microsoft.com/office/drawing/2014/main" id="{7501985B-83A1-844E-0CD5-4697E5BE549D}"/>
+              </a:ext>
+            </a:extLst>
+          </p:cNvPr>
+          <p:cNvSpPr txBox="1"/>
+          <p:nvPr/>
+        </p:nvSpPr>
+        <p:spPr>
+          <a:xfrm>
+            <a:off x="7582662" y="5129443"/>
+            <a:ext cx="4267962" cy="1200329"/>
+          </a:xfrm>
+          <a:prstGeom prst="rect">
+            <a:avLst/>
+          </a:prstGeom>
+          <a:noFill/>
+          <a:ln w="28575">
+            <a:solidFill>
+              <a:schemeClr val="tx1"/>
+            </a:solidFill>
+          </a:ln>
+        </p:spPr>
+        <p:txBody>
+          <a:bodyPr wrap="square">
+            <a:spAutoFit/>
+          </a:bodyPr>
+          <a:lstStyle/>
+          <a:p>
+            <a:r>
+              <a:rPr lang="vi-VN" b="0">
+                <a:solidFill>
+                  <a:schemeClr val="bg1"/>
+                </a:solidFill>
+                <a:effectLst/>
+                <a:latin typeface="+mj-lt"/>
+              </a:rPr>
+              <a:t>- Tọa độ x của cửa sổ= (chiều rộng của màn hình  -  chiều rộng của cửa sổ) / 2</a:t>
+            </a:r>
+          </a:p>
+          <a:p>
+            <a:r>
+              <a:rPr lang="vi-VN" b="0">
+                <a:solidFill>
+                  <a:schemeClr val="bg1"/>
+                </a:solidFill>
+                <a:effectLst/>
+                <a:latin typeface="+mj-lt"/>
+              </a:rPr>
+              <a:t>- Tọa độ y của cửa sổ= (chiều dài của màn hình  -  chiều dài của cửa sổ) / 2</a:t>
+            </a:r>
+          </a:p>
+        </p:txBody>
+      </p:sp>
     </p:spTree>
     <p:extLst>
       <p:ext uri="{BB962C8B-B14F-4D97-AF65-F5344CB8AC3E}">
@@ -3577,13 +3746,13 @@
   <p:clrMapOvr>
     <a:masterClrMapping/>
   </p:clrMapOvr>
-  <mc:AlternateContent xmlns:mc="http://schemas.openxmlformats.org/markup-compatibility/2006">
-    <mc:Choice xmlns:p159="http://schemas.microsoft.com/office/powerpoint/2015/09/main" Requires="p159">
+  <mc:AlternateContent xmlns:mc="http://schemas.openxmlformats.org/markup-compatibility/2006" xmlns:p159="http://schemas.microsoft.com/office/powerpoint/2015/09/main">
+    <mc:Choice Requires="p159">
       <p:transition xmlns:p14="http://schemas.microsoft.com/office/powerpoint/2010/main" spd="slow" p14:dur="2000">
         <p159:morph option="byObject"/>
       </p:transition>
     </mc:Choice>
-    <mc:Fallback>
+    <mc:Fallback xmlns="">
       <p:transition spd="slow">
         <p:fade/>
       </p:transition>

</xml_diff>